<commit_message>
HW2 req and design
</commit_message>
<xml_diff>
--- a/HW2/wildlife_tracker/dependencies.pptx
+++ b/HW2/wildlife_tracker/dependencies.pptx
@@ -261,7 +261,7 @@
           <a:p>
             <a:fld id="{EA3DC024-1F85-4336-AAA3-9B6520D2DB3A}" type="datetimeFigureOut">
               <a:rPr lang="en-US" smtClean="0"/>
-              <a:t>10/7/24</a:t>
+              <a:t>10/8/24</a:t>
             </a:fld>
             <a:endParaRPr lang="en-US"/>
           </a:p>
@@ -459,7 +459,7 @@
           <a:p>
             <a:fld id="{EA3DC024-1F85-4336-AAA3-9B6520D2DB3A}" type="datetimeFigureOut">
               <a:rPr lang="en-US" smtClean="0"/>
-              <a:t>10/7/24</a:t>
+              <a:t>10/8/24</a:t>
             </a:fld>
             <a:endParaRPr lang="en-US"/>
           </a:p>
@@ -667,7 +667,7 @@
           <a:p>
             <a:fld id="{EA3DC024-1F85-4336-AAA3-9B6520D2DB3A}" type="datetimeFigureOut">
               <a:rPr lang="en-US" smtClean="0"/>
-              <a:t>10/7/24</a:t>
+              <a:t>10/8/24</a:t>
             </a:fld>
             <a:endParaRPr lang="en-US"/>
           </a:p>
@@ -865,7 +865,7 @@
           <a:p>
             <a:fld id="{EA3DC024-1F85-4336-AAA3-9B6520D2DB3A}" type="datetimeFigureOut">
               <a:rPr lang="en-US" smtClean="0"/>
-              <a:t>10/7/24</a:t>
+              <a:t>10/8/24</a:t>
             </a:fld>
             <a:endParaRPr lang="en-US"/>
           </a:p>
@@ -1140,7 +1140,7 @@
           <a:p>
             <a:fld id="{EA3DC024-1F85-4336-AAA3-9B6520D2DB3A}" type="datetimeFigureOut">
               <a:rPr lang="en-US" smtClean="0"/>
-              <a:t>10/7/24</a:t>
+              <a:t>10/8/24</a:t>
             </a:fld>
             <a:endParaRPr lang="en-US"/>
           </a:p>
@@ -1405,7 +1405,7 @@
           <a:p>
             <a:fld id="{EA3DC024-1F85-4336-AAA3-9B6520D2DB3A}" type="datetimeFigureOut">
               <a:rPr lang="en-US" smtClean="0"/>
-              <a:t>10/7/24</a:t>
+              <a:t>10/8/24</a:t>
             </a:fld>
             <a:endParaRPr lang="en-US"/>
           </a:p>
@@ -1817,7 +1817,7 @@
           <a:p>
             <a:fld id="{EA3DC024-1F85-4336-AAA3-9B6520D2DB3A}" type="datetimeFigureOut">
               <a:rPr lang="en-US" smtClean="0"/>
-              <a:t>10/7/24</a:t>
+              <a:t>10/8/24</a:t>
             </a:fld>
             <a:endParaRPr lang="en-US"/>
           </a:p>
@@ -1958,7 +1958,7 @@
           <a:p>
             <a:fld id="{EA3DC024-1F85-4336-AAA3-9B6520D2DB3A}" type="datetimeFigureOut">
               <a:rPr lang="en-US" smtClean="0"/>
-              <a:t>10/7/24</a:t>
+              <a:t>10/8/24</a:t>
             </a:fld>
             <a:endParaRPr lang="en-US"/>
           </a:p>
@@ -2071,7 +2071,7 @@
           <a:p>
             <a:fld id="{EA3DC024-1F85-4336-AAA3-9B6520D2DB3A}" type="datetimeFigureOut">
               <a:rPr lang="en-US" smtClean="0"/>
-              <a:t>10/7/24</a:t>
+              <a:t>10/8/24</a:t>
             </a:fld>
             <a:endParaRPr lang="en-US"/>
           </a:p>
@@ -2382,7 +2382,7 @@
           <a:p>
             <a:fld id="{EA3DC024-1F85-4336-AAA3-9B6520D2DB3A}" type="datetimeFigureOut">
               <a:rPr lang="en-US" smtClean="0"/>
-              <a:t>10/7/24</a:t>
+              <a:t>10/8/24</a:t>
             </a:fld>
             <a:endParaRPr lang="en-US"/>
           </a:p>
@@ -2670,7 +2670,7 @@
           <a:p>
             <a:fld id="{EA3DC024-1F85-4336-AAA3-9B6520D2DB3A}" type="datetimeFigureOut">
               <a:rPr lang="en-US" smtClean="0"/>
-              <a:t>10/7/24</a:t>
+              <a:t>10/8/24</a:t>
             </a:fld>
             <a:endParaRPr lang="en-US"/>
           </a:p>
@@ -2911,7 +2911,7 @@
           <a:p>
             <a:fld id="{EA3DC024-1F85-4336-AAA3-9B6520D2DB3A}" type="datetimeFigureOut">
               <a:rPr lang="en-US" smtClean="0"/>
-              <a:t>10/7/24</a:t>
+              <a:t>10/8/24</a:t>
             </a:fld>
             <a:endParaRPr lang="en-US"/>
           </a:p>
@@ -3649,7 +3649,7 @@
           <p:spPr>
             <a:xfrm>
               <a:off x="449179" y="3118629"/>
-              <a:ext cx="2464777" cy="369332"/>
+              <a:ext cx="1976310" cy="369332"/>
             </a:xfrm>
             <a:prstGeom prst="rect">
               <a:avLst/>
@@ -3664,7 +3664,7 @@
             <a:p>
               <a:r>
                 <a:rPr lang="en-US" dirty="0"/>
-                <a:t>Migration Management</a:t>
+                <a:t>Migration Tracking</a:t>
               </a:r>
             </a:p>
           </p:txBody>
@@ -4781,7 +4781,7 @@
           <p:spPr>
             <a:xfrm>
               <a:off x="449179" y="3118629"/>
-              <a:ext cx="2464777" cy="369332"/>
+              <a:ext cx="1976310" cy="369332"/>
             </a:xfrm>
             <a:prstGeom prst="rect">
               <a:avLst/>
@@ -4796,7 +4796,7 @@
             <a:p>
               <a:r>
                 <a:rPr lang="en-US" dirty="0"/>
-                <a:t>Migration Management</a:t>
+                <a:t>Migration Tracking</a:t>
               </a:r>
             </a:p>
           </p:txBody>

</xml_diff>